<commit_message>
Update slides a bit
</commit_message>
<xml_diff>
--- a/Slides.pptx
+++ b/Slides.pptx
@@ -5,7 +5,7 @@
     <p:sldMasterId id="2147483715" r:id="rId4"/>
   </p:sldMasterIdLst>
   <p:notesMasterIdLst>
-    <p:notesMasterId r:id="rId26"/>
+    <p:notesMasterId r:id="rId27"/>
   </p:notesMasterIdLst>
   <p:sldIdLst>
     <p:sldId id="258" r:id="rId5"/>
@@ -29,6 +29,7 @@
     <p:sldId id="284" r:id="rId23"/>
     <p:sldId id="286" r:id="rId24"/>
     <p:sldId id="263" r:id="rId25"/>
+    <p:sldId id="287" r:id="rId26"/>
   </p:sldIdLst>
   <p:sldSz cx="12192000" cy="6858000"/>
   <p:notesSz cx="6858000" cy="9144000"/>
@@ -220,7 +221,7 @@
           <a:p>
             <a:fld id="{18438622-0837-4E9E-A16C-0B0206CE676E}" type="datetimeFigureOut">
               <a:rPr lang="en-US" smtClean="0"/>
-              <a:t>7/8/2019</a:t>
+              <a:t>9/7/2019</a:t>
             </a:fld>
             <a:endParaRPr lang="en-US"/>
           </a:p>
@@ -5547,9 +5548,17 @@
           <a:lstStyle/>
           <a:p>
             <a:r>
-              <a:rPr lang="en-US" dirty="0"/>
+              <a:rPr lang="en-US" b="1" dirty="0"/>
               <a:t>An Intro to Web Development</a:t>
             </a:r>
+            <a:br>
+              <a:rPr lang="en-US" b="1" dirty="0"/>
+            </a:br>
+            <a:r>
+              <a:rPr lang="en-US" sz="3600" dirty="0"/>
+              <a:t>ASP.NET Core Razor Pages Edition</a:t>
+            </a:r>
+            <a:endParaRPr lang="en-US" dirty="0"/>
           </a:p>
         </p:txBody>
       </p:sp>
@@ -6925,8 +6934,36 @@
           <a:lstStyle/>
           <a:p>
             <a:r>
+              <a:rPr lang="en-US" b="1" dirty="0"/>
+              <a:t>.NET</a:t>
+            </a:r>
+            <a:r>
               <a:rPr lang="en-US" dirty="0"/>
-              <a:t>.NET is a developer platform made up of tools, programming languages, and libraries for building many different types of applications.</a:t>
+              <a:t> is a </a:t>
+            </a:r>
+            <a:r>
+              <a:rPr lang="en-US" b="1" dirty="0"/>
+              <a:t>developer platform</a:t>
+            </a:r>
+            <a:r>
+              <a:rPr lang="en-US" dirty="0"/>
+              <a:t> made up of tools, programming languages, and libraries for </a:t>
+            </a:r>
+            <a:r>
+              <a:rPr lang="en-US" b="1" dirty="0"/>
+              <a:t>building</a:t>
+            </a:r>
+            <a:r>
+              <a:rPr lang="en-US" dirty="0"/>
+              <a:t> many different types of </a:t>
+            </a:r>
+            <a:r>
+              <a:rPr lang="en-US" b="1" dirty="0"/>
+              <a:t>applications</a:t>
+            </a:r>
+            <a:r>
+              <a:rPr lang="en-US" dirty="0"/>
+              <a:t>.</a:t>
             </a:r>
           </a:p>
           <a:p>
@@ -6935,7 +6972,15 @@
           <a:p>
             <a:r>
               <a:rPr lang="en-US" b="1" dirty="0"/>
-              <a:t>ASP.NET extends the .NET</a:t>
+              <a:t>ASP.NET extends</a:t>
+            </a:r>
+            <a:r>
+              <a:rPr lang="en-US" dirty="0"/>
+              <a:t> the </a:t>
+            </a:r>
+            <a:r>
+              <a:rPr lang="en-US" b="1" dirty="0"/>
+              <a:t>.NET</a:t>
             </a:r>
             <a:r>
               <a:rPr lang="en-US" dirty="0"/>
@@ -7254,6 +7299,67 @@
     <p:extLst>
       <p:ext uri="{BB962C8B-B14F-4D97-AF65-F5344CB8AC3E}">
         <p14:creationId xmlns:p14="http://schemas.microsoft.com/office/powerpoint/2010/main" val="3421048933"/>
+      </p:ext>
+    </p:extLst>
+  </p:cSld>
+  <p:clrMapOvr>
+    <a:masterClrMapping/>
+  </p:clrMapOvr>
+  <p:transition>
+    <p:fade/>
+  </p:transition>
+</p:sld>
+</file>
+
+<file path=ppt/slides/slide22.xml><?xml version="1.0" encoding="utf-8"?>
+<p:sld xmlns:a="http://schemas.openxmlformats.org/drawingml/2006/main" xmlns:r="http://schemas.openxmlformats.org/officeDocument/2006/relationships" xmlns:p="http://schemas.openxmlformats.org/presentationml/2006/main">
+  <p:cSld>
+    <p:spTree>
+      <p:nvGrpSpPr>
+        <p:cNvPr id="1" name=""/>
+        <p:cNvGrpSpPr/>
+        <p:nvPr/>
+      </p:nvGrpSpPr>
+      <p:grpSpPr>
+        <a:xfrm>
+          <a:off x="0" y="0"/>
+          <a:ext cx="0" cy="0"/>
+          <a:chOff x="0" y="0"/>
+          <a:chExt cx="0" cy="0"/>
+        </a:xfrm>
+      </p:grpSpPr>
+      <p:sp>
+        <p:nvSpPr>
+          <p:cNvPr id="3" name="Title 2">
+            <a:extLst>
+              <a:ext uri="{FF2B5EF4-FFF2-40B4-BE49-F238E27FC236}">
+                <a16:creationId xmlns:a16="http://schemas.microsoft.com/office/drawing/2014/main" id="{2DBCE1E5-CFA6-49CB-87A8-660D91F38723}"/>
+              </a:ext>
+            </a:extLst>
+          </p:cNvPr>
+          <p:cNvSpPr>
+            <a:spLocks noGrp="1"/>
+          </p:cNvSpPr>
+          <p:nvPr>
+            <p:ph type="title"/>
+          </p:nvPr>
+        </p:nvSpPr>
+        <p:spPr/>
+        <p:txBody>
+          <a:bodyPr/>
+          <a:lstStyle/>
+          <a:p>
+            <a:r>
+              <a:rPr lang="en-US" dirty="0"/>
+              <a:t>Thank You!</a:t>
+            </a:r>
+          </a:p>
+        </p:txBody>
+      </p:sp>
+    </p:spTree>
+    <p:extLst>
+      <p:ext uri="{BB962C8B-B14F-4D97-AF65-F5344CB8AC3E}">
+        <p14:creationId xmlns:p14="http://schemas.microsoft.com/office/powerpoint/2010/main" val="1550402367"/>
       </p:ext>
     </p:extLst>
   </p:cSld>

</xml_diff>